<commit_message>
Slides of first part updated
</commit_message>
<xml_diff>
--- a/documentation/pres_first_part.pptx
+++ b/documentation/pres_first_part.pptx
@@ -8797,7 +8797,15 @@
             </a:r>
             <a:r>
               <a:rPr lang="en-US" sz="1400" dirty="0"/>
-              <a:t>"is responsible for programming flows to a switch in response to a policy decision".</a:t>
+              <a:t>“</a:t>
+            </a:r>
+            <a:r>
+              <a:rPr lang="en-US" sz="1400" i="1" dirty="0"/>
+              <a:t>is the default module used for Floodlight's learning switch implementation. It inserts flows in switches that routes packets from the source to the destination</a:t>
+            </a:r>
+            <a:r>
+              <a:rPr lang="en-US" sz="1400" dirty="0"/>
+              <a:t>".</a:t>
             </a:r>
           </a:p>
           <a:p>
@@ -8832,7 +8840,7 @@
             </a:pPr>
             <a:r>
               <a:rPr lang="en-US" sz="1400" dirty="0"/>
-              <a:t>Maintain a list for storing the active intents</a:t>
+              <a:t>Maintain an array list for storing the active intents</a:t>
             </a:r>
           </a:p>
           <a:p>
@@ -10119,7 +10127,7 @@
             </a:r>
             <a:r>
               <a:rPr lang="it-IT" sz="1400" dirty="0" err="1"/>
-              <a:t>installes</a:t>
+              <a:t>installs</a:t>
             </a:r>
             <a:r>
               <a:rPr lang="it-IT" sz="1400" dirty="0"/>

</xml_diff>